<commit_message>
Adding more info to the slides
</commit_message>
<xml_diff>
--- a/Clases/PDO/slides/Introduccion PDO.pptx
+++ b/Clases/PDO/slides/Introduccion PDO.pptx
@@ -5,7 +5,7 @@
     <p:sldMasterId id="2147483659" r:id="rId1"/>
   </p:sldMasterIdLst>
   <p:notesMasterIdLst>
-    <p:notesMasterId r:id="rId13"/>
+    <p:notesMasterId r:id="rId14"/>
   </p:notesMasterIdLst>
   <p:sldIdLst>
     <p:sldId id="256" r:id="rId2"/>
@@ -18,7 +18,8 @@
     <p:sldId id="301" r:id="rId9"/>
     <p:sldId id="292" r:id="rId10"/>
     <p:sldId id="293" r:id="rId11"/>
-    <p:sldId id="295" r:id="rId12"/>
+    <p:sldId id="302" r:id="rId12"/>
+    <p:sldId id="295" r:id="rId13"/>
   </p:sldIdLst>
   <p:sldSz cx="9144000" cy="6858000" type="screen4x3"/>
   <p:notesSz cx="6858000" cy="9144000"/>
@@ -663,6 +664,106 @@
 </file>
 
 <file path=ppt/notesSlides/notesSlide11.xml><?xml version="1.0" encoding="utf-8"?>
+<p:notes xmlns:a="http://schemas.openxmlformats.org/drawingml/2006/main" xmlns:r="http://schemas.openxmlformats.org/officeDocument/2006/relationships" xmlns:p="http://schemas.openxmlformats.org/presentationml/2006/main" showMasterSp="0" showMasterPhAnim="0">
+  <p:cSld>
+    <p:spTree>
+      <p:nvGrpSpPr>
+        <p:cNvPr id="1" name="Shape 343"/>
+        <p:cNvGrpSpPr/>
+        <p:nvPr/>
+      </p:nvGrpSpPr>
+      <p:grpSpPr>
+        <a:xfrm>
+          <a:off x="0" y="0"/>
+          <a:ext cx="0" cy="0"/>
+          <a:chOff x="0" y="0"/>
+          <a:chExt cx="0" cy="0"/>
+        </a:xfrm>
+      </p:grpSpPr>
+      <p:sp>
+        <p:nvSpPr>
+          <p:cNvPr id="344" name="Shape 344"/>
+          <p:cNvSpPr txBox="1">
+            <a:spLocks noGrp="1"/>
+          </p:cNvSpPr>
+          <p:nvPr>
+            <p:ph type="body" idx="1"/>
+          </p:nvPr>
+        </p:nvSpPr>
+        <p:spPr>
+          <a:xfrm>
+            <a:off x="685800" y="4343400"/>
+            <a:ext cx="5486399" cy="4114800"/>
+          </a:xfrm>
+          <a:prstGeom prst="rect">
+            <a:avLst/>
+          </a:prstGeom>
+        </p:spPr>
+        <p:txBody>
+          <a:bodyPr lIns="91425" tIns="91425" rIns="91425" bIns="91425" anchor="ctr" anchorCtr="0">
+            <a:noAutofit/>
+          </a:bodyPr>
+          <a:lstStyle/>
+          <a:p>
+            <a:endParaRPr/>
+          </a:p>
+        </p:txBody>
+      </p:sp>
+      <p:sp>
+        <p:nvSpPr>
+          <p:cNvPr id="345" name="Shape 345"/>
+          <p:cNvSpPr>
+            <a:spLocks noGrp="1" noRot="1" noChangeAspect="1"/>
+          </p:cNvSpPr>
+          <p:nvPr>
+            <p:ph type="sldImg" idx="2"/>
+          </p:nvPr>
+        </p:nvSpPr>
+        <p:spPr>
+          <a:xfrm>
+            <a:off x="1143000" y="685800"/>
+            <a:ext cx="4572000" cy="3429000"/>
+          </a:xfrm>
+          <a:custGeom>
+            <a:avLst/>
+            <a:gdLst/>
+            <a:ahLst/>
+            <a:cxnLst/>
+            <a:rect l="0" t="0" r="0" b="0"/>
+            <a:pathLst>
+              <a:path w="120000" h="120000" extrusionOk="0">
+                <a:moveTo>
+                  <a:pt x="0" y="0"/>
+                </a:moveTo>
+                <a:lnTo>
+                  <a:pt x="120000" y="0"/>
+                </a:lnTo>
+                <a:lnTo>
+                  <a:pt x="120000" y="120000"/>
+                </a:lnTo>
+                <a:lnTo>
+                  <a:pt x="0" y="120000"/>
+                </a:lnTo>
+                <a:close/>
+              </a:path>
+            </a:pathLst>
+          </a:custGeom>
+        </p:spPr>
+      </p:sp>
+    </p:spTree>
+    <p:extLst>
+      <p:ext uri="{BB962C8B-B14F-4D97-AF65-F5344CB8AC3E}">
+        <p14:creationId xmlns:p14="http://schemas.microsoft.com/office/powerpoint/2010/main" val="3806633372"/>
+      </p:ext>
+    </p:extLst>
+  </p:cSld>
+  <p:clrMapOvr>
+    <a:masterClrMapping/>
+  </p:clrMapOvr>
+</p:notes>
+</file>
+
+<file path=ppt/notesSlides/notesSlide12.xml><?xml version="1.0" encoding="utf-8"?>
 <p:notes xmlns:a="http://schemas.openxmlformats.org/drawingml/2006/main" xmlns:r="http://schemas.openxmlformats.org/officeDocument/2006/relationships" xmlns:p="http://schemas.openxmlformats.org/presentationml/2006/main" showMasterSp="0" showMasterPhAnim="0">
   <p:cSld>
     <p:spTree>
@@ -10365,6 +10466,260 @@
               <a:buNone/>
             </a:pPr>
             <a:r>
+              <a:rPr lang="es-AR" sz="3600" b="0" i="0" u="none" strike="noStrike" cap="small" baseline="0" dirty="0" smtClean="0">
+                <a:solidFill>
+                  <a:schemeClr val="dk2"/>
+                </a:solidFill>
+                <a:latin typeface="Arial Black"/>
+                <a:ea typeface="Arial Black"/>
+                <a:cs typeface="Arial Black"/>
+                <a:sym typeface="Arial Black"/>
+              </a:rPr>
+              <a:t>Mas</a:t>
+            </a:r>
+            <a:r>
+              <a:rPr lang="es-AR" sz="3600" b="0" i="0" u="none" strike="noStrike" cap="small" dirty="0" smtClean="0">
+                <a:solidFill>
+                  <a:schemeClr val="dk2"/>
+                </a:solidFill>
+                <a:latin typeface="Arial Black"/>
+                <a:ea typeface="Arial Black"/>
+                <a:cs typeface="Arial Black"/>
+                <a:sym typeface="Arial Black"/>
+              </a:rPr>
+              <a:t> Información</a:t>
+            </a:r>
+            <a:endParaRPr lang="es-AR" sz="3600" b="0" i="0" u="none" strike="noStrike" cap="small" baseline="0" dirty="0">
+              <a:solidFill>
+                <a:schemeClr val="dk2"/>
+              </a:solidFill>
+              <a:latin typeface="Arial Black"/>
+              <a:ea typeface="Arial Black"/>
+              <a:cs typeface="Arial Black"/>
+              <a:sym typeface="Arial Black"/>
+            </a:endParaRPr>
+          </a:p>
+        </p:txBody>
+      </p:sp>
+      <p:sp>
+        <p:nvSpPr>
+          <p:cNvPr id="342" name="Shape 342"/>
+          <p:cNvSpPr txBox="1">
+            <a:spLocks noGrp="1"/>
+          </p:cNvSpPr>
+          <p:nvPr>
+            <p:ph type="body" idx="1"/>
+          </p:nvPr>
+        </p:nvSpPr>
+        <p:spPr>
+          <a:xfrm>
+            <a:off x="457200" y="1752600"/>
+            <a:ext cx="7619999" cy="4772744"/>
+          </a:xfrm>
+          <a:prstGeom prst="rect">
+            <a:avLst/>
+          </a:prstGeom>
+          <a:noFill/>
+          <a:ln>
+            <a:noFill/>
+          </a:ln>
+        </p:spPr>
+        <p:txBody>
+          <a:bodyPr lIns="91425" tIns="45700" rIns="91425" bIns="45700" anchor="t" anchorCtr="0">
+            <a:noAutofit/>
+          </a:bodyPr>
+          <a:lstStyle/>
+          <a:p>
+            <a:r>
+              <a:rPr lang="es-AR" dirty="0" smtClean="0"/>
+              <a:t>Documentación Oficial</a:t>
+            </a:r>
+          </a:p>
+          <a:p>
+            <a:r>
+              <a:rPr lang="en-US" dirty="0">
+                <a:hlinkClick r:id="rId3"/>
+              </a:rPr>
+              <a:t>http://</a:t>
+            </a:r>
+            <a:r>
+              <a:rPr lang="en-US" dirty="0" smtClean="0">
+                <a:hlinkClick r:id="rId3"/>
+              </a:rPr>
+              <a:t>php.net/manual/en/book.pdo.php</a:t>
+            </a:r>
+            <a:endParaRPr lang="en-US" dirty="0" smtClean="0"/>
+          </a:p>
+          <a:p>
+            <a:endParaRPr lang="en-US" sz="2000" b="0" i="0" u="none" strike="noStrike" cap="none" baseline="0" dirty="0">
+              <a:solidFill>
+                <a:schemeClr val="dk1"/>
+              </a:solidFill>
+              <a:latin typeface="Arial"/>
+              <a:ea typeface="Arial"/>
+              <a:cs typeface="Arial"/>
+              <a:sym typeface="Arial"/>
+            </a:endParaRPr>
+          </a:p>
+          <a:p>
+            <a:r>
+              <a:rPr lang="en-US" dirty="0" err="1" smtClean="0"/>
+              <a:t>Php</a:t>
+            </a:r>
+            <a:r>
+              <a:rPr lang="en-US" dirty="0" smtClean="0"/>
+              <a:t> Every Day</a:t>
+            </a:r>
+          </a:p>
+          <a:p>
+            <a:pPr marL="0" lvl="1" indent="0">
+              <a:spcAft>
+                <a:spcPts val="600"/>
+              </a:spcAft>
+              <a:buClr>
+                <a:schemeClr val="dk1"/>
+              </a:buClr>
+              <a:buNone/>
+            </a:pPr>
+            <a:r>
+              <a:rPr lang="en-US" dirty="0">
+                <a:hlinkClick r:id="rId4"/>
+              </a:rPr>
+              <a:t>http://www.phpeveryday.com/articles/PDO-Activation-PHP-Data-Objects-Extension-P544.html</a:t>
+            </a:r>
+            <a:endParaRPr lang="en-US" dirty="0"/>
+          </a:p>
+          <a:p>
+            <a:endParaRPr lang="es-AR" sz="2000" b="0" i="0" u="none" strike="noStrike" cap="none" baseline="0" dirty="0">
+              <a:solidFill>
+                <a:schemeClr val="dk1"/>
+              </a:solidFill>
+              <a:latin typeface="Arial"/>
+              <a:ea typeface="Arial"/>
+              <a:cs typeface="Arial"/>
+              <a:sym typeface="Arial"/>
+            </a:endParaRPr>
+          </a:p>
+          <a:p>
+            <a:endParaRPr lang="es-AR" sz="2000" b="0" i="0" u="none" strike="noStrike" cap="none" baseline="0" dirty="0">
+              <a:solidFill>
+                <a:schemeClr val="dk1"/>
+              </a:solidFill>
+              <a:latin typeface="Arial"/>
+              <a:ea typeface="Arial"/>
+              <a:cs typeface="Arial"/>
+              <a:sym typeface="Arial"/>
+            </a:endParaRPr>
+          </a:p>
+          <a:p>
+            <a:endParaRPr lang="es-AR" sz="2000" b="0" i="0" u="none" strike="noStrike" cap="none" baseline="0" dirty="0">
+              <a:solidFill>
+                <a:schemeClr val="dk1"/>
+              </a:solidFill>
+              <a:latin typeface="Arial"/>
+              <a:ea typeface="Arial"/>
+              <a:cs typeface="Arial"/>
+              <a:sym typeface="Arial"/>
+            </a:endParaRPr>
+          </a:p>
+          <a:p>
+            <a:endParaRPr lang="es-AR" sz="2000" b="0" i="0" u="none" strike="noStrike" cap="none" baseline="0" dirty="0">
+              <a:solidFill>
+                <a:schemeClr val="dk1"/>
+              </a:solidFill>
+              <a:latin typeface="Arial"/>
+              <a:ea typeface="Arial"/>
+              <a:cs typeface="Arial"/>
+              <a:sym typeface="Arial"/>
+            </a:endParaRPr>
+          </a:p>
+          <a:p>
+            <a:endParaRPr lang="es-AR" sz="2000" b="0" i="0" u="none" strike="noStrike" cap="none" baseline="0" dirty="0">
+              <a:solidFill>
+                <a:schemeClr val="dk1"/>
+              </a:solidFill>
+              <a:latin typeface="Arial"/>
+              <a:ea typeface="Arial"/>
+              <a:cs typeface="Arial"/>
+              <a:sym typeface="Arial"/>
+            </a:endParaRPr>
+          </a:p>
+        </p:txBody>
+      </p:sp>
+    </p:spTree>
+    <p:extLst>
+      <p:ext uri="{BB962C8B-B14F-4D97-AF65-F5344CB8AC3E}">
+        <p14:creationId xmlns:p14="http://schemas.microsoft.com/office/powerpoint/2010/main" val="1695743130"/>
+      </p:ext>
+    </p:extLst>
+  </p:cSld>
+  <p:clrMapOvr>
+    <a:masterClrMapping/>
+  </p:clrMapOvr>
+  <p:transition spd="slow">
+    <p:cut/>
+  </p:transition>
+</p:sld>
+</file>
+
+<file path=ppt/slides/slide12.xml><?xml version="1.0" encoding="utf-8"?>
+<p:sld xmlns:a="http://schemas.openxmlformats.org/drawingml/2006/main" xmlns:r="http://schemas.openxmlformats.org/officeDocument/2006/relationships" xmlns:p="http://schemas.openxmlformats.org/presentationml/2006/main">
+  <p:cSld>
+    <p:spTree>
+      <p:nvGrpSpPr>
+        <p:cNvPr id="1" name="Shape 340"/>
+        <p:cNvGrpSpPr/>
+        <p:nvPr/>
+      </p:nvGrpSpPr>
+      <p:grpSpPr>
+        <a:xfrm>
+          <a:off x="0" y="0"/>
+          <a:ext cx="0" cy="0"/>
+          <a:chOff x="0" y="0"/>
+          <a:chExt cx="0" cy="0"/>
+        </a:xfrm>
+      </p:grpSpPr>
+      <p:sp>
+        <p:nvSpPr>
+          <p:cNvPr id="341" name="Shape 341"/>
+          <p:cNvSpPr txBox="1">
+            <a:spLocks noGrp="1"/>
+          </p:cNvSpPr>
+          <p:nvPr>
+            <p:ph type="title"/>
+          </p:nvPr>
+        </p:nvSpPr>
+        <p:spPr>
+          <a:xfrm>
+            <a:off x="457200" y="152718"/>
+            <a:ext cx="6563072" cy="1371599"/>
+          </a:xfrm>
+          <a:prstGeom prst="rect">
+            <a:avLst/>
+          </a:prstGeom>
+          <a:noFill/>
+          <a:ln>
+            <a:noFill/>
+          </a:ln>
+        </p:spPr>
+        <p:txBody>
+          <a:bodyPr lIns="91425" tIns="45700" rIns="91425" bIns="45700" anchor="b" anchorCtr="0">
+            <a:noAutofit/>
+          </a:bodyPr>
+          <a:lstStyle/>
+          <a:p>
+            <a:pPr marL="0" marR="0" lvl="0" indent="0" algn="l" rtl="0">
+              <a:spcBef>
+                <a:spcPts val="0"/>
+              </a:spcBef>
+              <a:buClr>
+                <a:schemeClr val="dk2"/>
+              </a:buClr>
+              <a:buSzPct val="25000"/>
+              <a:buFont typeface="Arial Black"/>
+              <a:buNone/>
+            </a:pPr>
+            <a:r>
               <a:rPr lang="es-AR" sz="3600" b="0" i="0" u="none" strike="noStrike" cap="small" baseline="0">
                 <a:solidFill>
                   <a:schemeClr val="dk2"/>
@@ -12770,11 +13125,7 @@
             </a:r>
             <a:r>
               <a:rPr lang="es-AR" b="0" dirty="0" smtClean="0"/>
-              <a:t> y el archivo index.html dentro de su carpeta</a:t>
-            </a:r>
-            <a:r>
-              <a:rPr lang="es-AR" b="0" dirty="0" smtClean="0"/>
-              <a:t>.</a:t>
+              <a:t> y el archivo index.html dentro de su carpeta.</a:t>
             </a:r>
           </a:p>
           <a:p>
@@ -12812,7 +13163,6 @@
               <a:rPr lang="es-AR" b="0" dirty="0" smtClean="0"/>
               <a:t>.</a:t>
             </a:r>
-            <a:endParaRPr lang="es-AR" b="0" dirty="0" smtClean="0"/>
           </a:p>
           <a:p>
             <a:pPr marL="342900" marR="0" lvl="0" indent="-342900" algn="l" rtl="0">

</xml_diff>